<commit_message>
Update figures for new project organization
</commit_message>
<xml_diff>
--- a/figures/dm-subsystem-science.pptx
+++ b/figures/dm-subsystem-science.pptx
@@ -162,10 +162,9 @@
           <a:lstStyle/>
           <a:p>
             <a:r>
-              <a:rPr lang="en-US" smtClean="0"/>
+              <a:rPr lang="en-US"/>
               <a:t>Click to edit Master title style</a:t>
             </a:r>
-            <a:endParaRPr lang="en-US"/>
           </a:p>
         </p:txBody>
       </p:sp>
@@ -281,10 +280,9 @@
           </a:lstStyle>
           <a:p>
             <a:r>
-              <a:rPr lang="en-US" smtClean="0"/>
+              <a:rPr lang="en-US"/>
               <a:t>Click to edit Master subtitle style</a:t>
             </a:r>
-            <a:endParaRPr lang="en-US"/>
           </a:p>
         </p:txBody>
       </p:sp>
@@ -305,7 +303,7 @@
           <a:p>
             <a:fld id="{CEB23FBE-18A0-7F48-9D3B-04F8D8EBF31D}" type="datetimeFigureOut">
               <a:rPr lang="en-US" smtClean="0"/>
-              <a:t>5/6/17</a:t>
+              <a:t>5/25/22</a:t>
             </a:fld>
             <a:endParaRPr lang="en-US"/>
           </a:p>
@@ -399,10 +397,9 @@
           <a:lstStyle/>
           <a:p>
             <a:r>
-              <a:rPr lang="en-US" smtClean="0"/>
+              <a:rPr lang="en-US"/>
               <a:t>Click to edit Master title style</a:t>
             </a:r>
-            <a:endParaRPr lang="en-US"/>
           </a:p>
         </p:txBody>
       </p:sp>
@@ -423,38 +420,37 @@
           <a:p>
             <a:pPr lvl="0"/>
             <a:r>
-              <a:rPr lang="en-US" smtClean="0"/>
+              <a:rPr lang="en-US"/>
               <a:t>Click to edit Master text styles</a:t>
             </a:r>
           </a:p>
           <a:p>
             <a:pPr lvl="1"/>
             <a:r>
-              <a:rPr lang="en-US" smtClean="0"/>
+              <a:rPr lang="en-US"/>
               <a:t>Second level</a:t>
             </a:r>
           </a:p>
           <a:p>
             <a:pPr lvl="2"/>
             <a:r>
-              <a:rPr lang="en-US" smtClean="0"/>
+              <a:rPr lang="en-US"/>
               <a:t>Third level</a:t>
             </a:r>
           </a:p>
           <a:p>
             <a:pPr lvl="3"/>
             <a:r>
-              <a:rPr lang="en-US" smtClean="0"/>
+              <a:rPr lang="en-US"/>
               <a:t>Fourth level</a:t>
             </a:r>
           </a:p>
           <a:p>
             <a:pPr lvl="4"/>
             <a:r>
-              <a:rPr lang="en-US" smtClean="0"/>
+              <a:rPr lang="en-US"/>
               <a:t>Fifth level</a:t>
             </a:r>
-            <a:endParaRPr lang="en-US"/>
           </a:p>
         </p:txBody>
       </p:sp>
@@ -475,7 +471,7 @@
           <a:p>
             <a:fld id="{CEB23FBE-18A0-7F48-9D3B-04F8D8EBF31D}" type="datetimeFigureOut">
               <a:rPr lang="en-US" smtClean="0"/>
-              <a:t>5/6/17</a:t>
+              <a:t>5/25/22</a:t>
             </a:fld>
             <a:endParaRPr lang="en-US"/>
           </a:p>
@@ -574,10 +570,9 @@
           <a:lstStyle/>
           <a:p>
             <a:r>
-              <a:rPr lang="en-US" smtClean="0"/>
+              <a:rPr lang="en-US"/>
               <a:t>Click to edit Master title style</a:t>
             </a:r>
-            <a:endParaRPr lang="en-US"/>
           </a:p>
         </p:txBody>
       </p:sp>
@@ -603,38 +598,37 @@
           <a:p>
             <a:pPr lvl="0"/>
             <a:r>
-              <a:rPr lang="en-US" smtClean="0"/>
+              <a:rPr lang="en-US"/>
               <a:t>Click to edit Master text styles</a:t>
             </a:r>
           </a:p>
           <a:p>
             <a:pPr lvl="1"/>
             <a:r>
-              <a:rPr lang="en-US" smtClean="0"/>
+              <a:rPr lang="en-US"/>
               <a:t>Second level</a:t>
             </a:r>
           </a:p>
           <a:p>
             <a:pPr lvl="2"/>
             <a:r>
-              <a:rPr lang="en-US" smtClean="0"/>
+              <a:rPr lang="en-US"/>
               <a:t>Third level</a:t>
             </a:r>
           </a:p>
           <a:p>
             <a:pPr lvl="3"/>
             <a:r>
-              <a:rPr lang="en-US" smtClean="0"/>
+              <a:rPr lang="en-US"/>
               <a:t>Fourth level</a:t>
             </a:r>
           </a:p>
           <a:p>
             <a:pPr lvl="4"/>
             <a:r>
-              <a:rPr lang="en-US" smtClean="0"/>
+              <a:rPr lang="en-US"/>
               <a:t>Fifth level</a:t>
             </a:r>
-            <a:endParaRPr lang="en-US"/>
           </a:p>
         </p:txBody>
       </p:sp>
@@ -655,7 +649,7 @@
           <a:p>
             <a:fld id="{CEB23FBE-18A0-7F48-9D3B-04F8D8EBF31D}" type="datetimeFigureOut">
               <a:rPr lang="en-US" smtClean="0"/>
-              <a:t>5/6/17</a:t>
+              <a:t>5/25/22</a:t>
             </a:fld>
             <a:endParaRPr lang="en-US"/>
           </a:p>
@@ -749,10 +743,9 @@
           <a:lstStyle/>
           <a:p>
             <a:r>
-              <a:rPr lang="en-US" dirty="0" smtClean="0"/>
+              <a:rPr lang="en-US" dirty="0"/>
               <a:t>Click to Edit Master Title Style</a:t>
             </a:r>
-            <a:endParaRPr lang="en-US" dirty="0"/>
           </a:p>
         </p:txBody>
       </p:sp>
@@ -792,35 +785,35 @@
           <a:p>
             <a:pPr lvl="0"/>
             <a:r>
-              <a:rPr lang="en-US" smtClean="0"/>
+              <a:rPr lang="en-US"/>
               <a:t>Click to edit Master text styles</a:t>
             </a:r>
           </a:p>
           <a:p>
             <a:pPr lvl="1"/>
             <a:r>
-              <a:rPr lang="en-US" smtClean="0"/>
+              <a:rPr lang="en-US"/>
               <a:t>Second level</a:t>
             </a:r>
           </a:p>
           <a:p>
             <a:pPr lvl="2"/>
             <a:r>
-              <a:rPr lang="en-US" smtClean="0"/>
+              <a:rPr lang="en-US"/>
               <a:t>Third level</a:t>
             </a:r>
           </a:p>
           <a:p>
             <a:pPr lvl="3"/>
             <a:r>
-              <a:rPr lang="en-US" smtClean="0"/>
+              <a:rPr lang="en-US"/>
               <a:t>Fourth level</a:t>
             </a:r>
           </a:p>
           <a:p>
             <a:pPr lvl="4"/>
             <a:r>
-              <a:rPr lang="en-US" smtClean="0"/>
+              <a:rPr lang="en-US"/>
               <a:t>Fifth level</a:t>
             </a:r>
             <a:endParaRPr lang="en-US" dirty="0"/>
@@ -873,10 +866,9 @@
           <a:lstStyle/>
           <a:p>
             <a:r>
-              <a:rPr lang="en-US" smtClean="0"/>
+              <a:rPr lang="en-US"/>
               <a:t>Click to edit Master title style</a:t>
             </a:r>
-            <a:endParaRPr lang="en-US"/>
           </a:p>
         </p:txBody>
       </p:sp>
@@ -897,38 +889,37 @@
           <a:p>
             <a:pPr lvl="0"/>
             <a:r>
-              <a:rPr lang="en-US" smtClean="0"/>
+              <a:rPr lang="en-US"/>
               <a:t>Click to edit Master text styles</a:t>
             </a:r>
           </a:p>
           <a:p>
             <a:pPr lvl="1"/>
             <a:r>
-              <a:rPr lang="en-US" smtClean="0"/>
+              <a:rPr lang="en-US"/>
               <a:t>Second level</a:t>
             </a:r>
           </a:p>
           <a:p>
             <a:pPr lvl="2"/>
             <a:r>
-              <a:rPr lang="en-US" smtClean="0"/>
+              <a:rPr lang="en-US"/>
               <a:t>Third level</a:t>
             </a:r>
           </a:p>
           <a:p>
             <a:pPr lvl="3"/>
             <a:r>
-              <a:rPr lang="en-US" smtClean="0"/>
+              <a:rPr lang="en-US"/>
               <a:t>Fourth level</a:t>
             </a:r>
           </a:p>
           <a:p>
             <a:pPr lvl="4"/>
             <a:r>
-              <a:rPr lang="en-US" smtClean="0"/>
+              <a:rPr lang="en-US"/>
               <a:t>Fifth level</a:t>
             </a:r>
-            <a:endParaRPr lang="en-US"/>
           </a:p>
         </p:txBody>
       </p:sp>
@@ -949,7 +940,7 @@
           <a:p>
             <a:fld id="{CEB23FBE-18A0-7F48-9D3B-04F8D8EBF31D}" type="datetimeFigureOut">
               <a:rPr lang="en-US" smtClean="0"/>
-              <a:t>5/6/17</a:t>
+              <a:t>5/25/22</a:t>
             </a:fld>
             <a:endParaRPr lang="en-US"/>
           </a:p>
@@ -1052,10 +1043,9 @@
           </a:lstStyle>
           <a:p>
             <a:r>
-              <a:rPr lang="en-US" smtClean="0"/>
+              <a:rPr lang="en-US"/>
               <a:t>Click to edit Master title style</a:t>
             </a:r>
-            <a:endParaRPr lang="en-US"/>
           </a:p>
         </p:txBody>
       </p:sp>
@@ -1172,7 +1162,7 @@
           <a:p>
             <a:pPr lvl="0"/>
             <a:r>
-              <a:rPr lang="en-US" smtClean="0"/>
+              <a:rPr lang="en-US"/>
               <a:t>Click to edit Master text styles</a:t>
             </a:r>
           </a:p>
@@ -1195,7 +1185,7 @@
           <a:p>
             <a:fld id="{CEB23FBE-18A0-7F48-9D3B-04F8D8EBF31D}" type="datetimeFigureOut">
               <a:rPr lang="en-US" smtClean="0"/>
-              <a:t>5/6/17</a:t>
+              <a:t>5/25/22</a:t>
             </a:fld>
             <a:endParaRPr lang="en-US"/>
           </a:p>
@@ -1289,10 +1279,9 @@
           <a:lstStyle/>
           <a:p>
             <a:r>
-              <a:rPr lang="en-US" smtClean="0"/>
+              <a:rPr lang="en-US"/>
               <a:t>Click to edit Master title style</a:t>
             </a:r>
-            <a:endParaRPr lang="en-US"/>
           </a:p>
         </p:txBody>
       </p:sp>
@@ -1346,38 +1335,37 @@
           <a:p>
             <a:pPr lvl="0"/>
             <a:r>
-              <a:rPr lang="en-US" smtClean="0"/>
+              <a:rPr lang="en-US"/>
               <a:t>Click to edit Master text styles</a:t>
             </a:r>
           </a:p>
           <a:p>
             <a:pPr lvl="1"/>
             <a:r>
-              <a:rPr lang="en-US" smtClean="0"/>
+              <a:rPr lang="en-US"/>
               <a:t>Second level</a:t>
             </a:r>
           </a:p>
           <a:p>
             <a:pPr lvl="2"/>
             <a:r>
-              <a:rPr lang="en-US" smtClean="0"/>
+              <a:rPr lang="en-US"/>
               <a:t>Third level</a:t>
             </a:r>
           </a:p>
           <a:p>
             <a:pPr lvl="3"/>
             <a:r>
-              <a:rPr lang="en-US" smtClean="0"/>
+              <a:rPr lang="en-US"/>
               <a:t>Fourth level</a:t>
             </a:r>
           </a:p>
           <a:p>
             <a:pPr lvl="4"/>
             <a:r>
-              <a:rPr lang="en-US" smtClean="0"/>
+              <a:rPr lang="en-US"/>
               <a:t>Fifth level</a:t>
             </a:r>
-            <a:endParaRPr lang="en-US"/>
           </a:p>
         </p:txBody>
       </p:sp>
@@ -1431,38 +1419,37 @@
           <a:p>
             <a:pPr lvl="0"/>
             <a:r>
-              <a:rPr lang="en-US" smtClean="0"/>
+              <a:rPr lang="en-US"/>
               <a:t>Click to edit Master text styles</a:t>
             </a:r>
           </a:p>
           <a:p>
             <a:pPr lvl="1"/>
             <a:r>
-              <a:rPr lang="en-US" smtClean="0"/>
+              <a:rPr lang="en-US"/>
               <a:t>Second level</a:t>
             </a:r>
           </a:p>
           <a:p>
             <a:pPr lvl="2"/>
             <a:r>
-              <a:rPr lang="en-US" smtClean="0"/>
+              <a:rPr lang="en-US"/>
               <a:t>Third level</a:t>
             </a:r>
           </a:p>
           <a:p>
             <a:pPr lvl="3"/>
             <a:r>
-              <a:rPr lang="en-US" smtClean="0"/>
+              <a:rPr lang="en-US"/>
               <a:t>Fourth level</a:t>
             </a:r>
           </a:p>
           <a:p>
             <a:pPr lvl="4"/>
             <a:r>
-              <a:rPr lang="en-US" smtClean="0"/>
+              <a:rPr lang="en-US"/>
               <a:t>Fifth level</a:t>
             </a:r>
-            <a:endParaRPr lang="en-US"/>
           </a:p>
         </p:txBody>
       </p:sp>
@@ -1483,7 +1470,7 @@
           <a:p>
             <a:fld id="{CEB23FBE-18A0-7F48-9D3B-04F8D8EBF31D}" type="datetimeFigureOut">
               <a:rPr lang="en-US" smtClean="0"/>
-              <a:t>5/6/17</a:t>
+              <a:t>5/25/22</a:t>
             </a:fld>
             <a:endParaRPr lang="en-US"/>
           </a:p>
@@ -1581,10 +1568,9 @@
           </a:lstStyle>
           <a:p>
             <a:r>
-              <a:rPr lang="en-US" smtClean="0"/>
+              <a:rPr lang="en-US"/>
               <a:t>Click to edit Master title style</a:t>
             </a:r>
-            <a:endParaRPr lang="en-US"/>
           </a:p>
         </p:txBody>
       </p:sp>
@@ -1647,7 +1633,7 @@
           <a:p>
             <a:pPr lvl="0"/>
             <a:r>
-              <a:rPr lang="en-US" smtClean="0"/>
+              <a:rPr lang="en-US"/>
               <a:t>Click to edit Master text styles</a:t>
             </a:r>
           </a:p>
@@ -1703,38 +1689,37 @@
           <a:p>
             <a:pPr lvl="0"/>
             <a:r>
-              <a:rPr lang="en-US" smtClean="0"/>
+              <a:rPr lang="en-US"/>
               <a:t>Click to edit Master text styles</a:t>
             </a:r>
           </a:p>
           <a:p>
             <a:pPr lvl="1"/>
             <a:r>
-              <a:rPr lang="en-US" smtClean="0"/>
+              <a:rPr lang="en-US"/>
               <a:t>Second level</a:t>
             </a:r>
           </a:p>
           <a:p>
             <a:pPr lvl="2"/>
             <a:r>
-              <a:rPr lang="en-US" smtClean="0"/>
+              <a:rPr lang="en-US"/>
               <a:t>Third level</a:t>
             </a:r>
           </a:p>
           <a:p>
             <a:pPr lvl="3"/>
             <a:r>
-              <a:rPr lang="en-US" smtClean="0"/>
+              <a:rPr lang="en-US"/>
               <a:t>Fourth level</a:t>
             </a:r>
           </a:p>
           <a:p>
             <a:pPr lvl="4"/>
             <a:r>
-              <a:rPr lang="en-US" smtClean="0"/>
+              <a:rPr lang="en-US"/>
               <a:t>Fifth level</a:t>
             </a:r>
-            <a:endParaRPr lang="en-US"/>
           </a:p>
         </p:txBody>
       </p:sp>
@@ -1797,7 +1782,7 @@
           <a:p>
             <a:pPr lvl="0"/>
             <a:r>
-              <a:rPr lang="en-US" smtClean="0"/>
+              <a:rPr lang="en-US"/>
               <a:t>Click to edit Master text styles</a:t>
             </a:r>
           </a:p>
@@ -1853,38 +1838,37 @@
           <a:p>
             <a:pPr lvl="0"/>
             <a:r>
-              <a:rPr lang="en-US" smtClean="0"/>
+              <a:rPr lang="en-US"/>
               <a:t>Click to edit Master text styles</a:t>
             </a:r>
           </a:p>
           <a:p>
             <a:pPr lvl="1"/>
             <a:r>
-              <a:rPr lang="en-US" smtClean="0"/>
+              <a:rPr lang="en-US"/>
               <a:t>Second level</a:t>
             </a:r>
           </a:p>
           <a:p>
             <a:pPr lvl="2"/>
             <a:r>
-              <a:rPr lang="en-US" smtClean="0"/>
+              <a:rPr lang="en-US"/>
               <a:t>Third level</a:t>
             </a:r>
           </a:p>
           <a:p>
             <a:pPr lvl="3"/>
             <a:r>
-              <a:rPr lang="en-US" smtClean="0"/>
+              <a:rPr lang="en-US"/>
               <a:t>Fourth level</a:t>
             </a:r>
           </a:p>
           <a:p>
             <a:pPr lvl="4"/>
             <a:r>
-              <a:rPr lang="en-US" smtClean="0"/>
+              <a:rPr lang="en-US"/>
               <a:t>Fifth level</a:t>
             </a:r>
-            <a:endParaRPr lang="en-US"/>
           </a:p>
         </p:txBody>
       </p:sp>
@@ -1905,7 +1889,7 @@
           <a:p>
             <a:fld id="{CEB23FBE-18A0-7F48-9D3B-04F8D8EBF31D}" type="datetimeFigureOut">
               <a:rPr lang="en-US" smtClean="0"/>
-              <a:t>5/6/17</a:t>
+              <a:t>5/25/22</a:t>
             </a:fld>
             <a:endParaRPr lang="en-US"/>
           </a:p>
@@ -1999,10 +1983,9 @@
           <a:lstStyle/>
           <a:p>
             <a:r>
-              <a:rPr lang="en-US" smtClean="0"/>
+              <a:rPr lang="en-US"/>
               <a:t>Click to edit Master title style</a:t>
             </a:r>
-            <a:endParaRPr lang="en-US"/>
           </a:p>
         </p:txBody>
       </p:sp>
@@ -2023,7 +2006,7 @@
           <a:p>
             <a:fld id="{CEB23FBE-18A0-7F48-9D3B-04F8D8EBF31D}" type="datetimeFigureOut">
               <a:rPr lang="en-US" smtClean="0"/>
-              <a:t>5/6/17</a:t>
+              <a:t>5/25/22</a:t>
             </a:fld>
             <a:endParaRPr lang="en-US"/>
           </a:p>
@@ -2118,7 +2101,7 @@
           <a:p>
             <a:fld id="{CEB23FBE-18A0-7F48-9D3B-04F8D8EBF31D}" type="datetimeFigureOut">
               <a:rPr lang="en-US" smtClean="0"/>
-              <a:t>5/6/17</a:t>
+              <a:t>5/25/22</a:t>
             </a:fld>
             <a:endParaRPr lang="en-US"/>
           </a:p>
@@ -2221,10 +2204,9 @@
           </a:lstStyle>
           <a:p>
             <a:r>
-              <a:rPr lang="en-US" smtClean="0"/>
+              <a:rPr lang="en-US"/>
               <a:t>Click to edit Master title style</a:t>
             </a:r>
-            <a:endParaRPr lang="en-US"/>
           </a:p>
         </p:txBody>
       </p:sp>
@@ -2278,38 +2260,37 @@
           <a:p>
             <a:pPr lvl="0"/>
             <a:r>
-              <a:rPr lang="en-US" smtClean="0"/>
+              <a:rPr lang="en-US"/>
               <a:t>Click to edit Master text styles</a:t>
             </a:r>
           </a:p>
           <a:p>
             <a:pPr lvl="1"/>
             <a:r>
-              <a:rPr lang="en-US" smtClean="0"/>
+              <a:rPr lang="en-US"/>
               <a:t>Second level</a:t>
             </a:r>
           </a:p>
           <a:p>
             <a:pPr lvl="2"/>
             <a:r>
-              <a:rPr lang="en-US" smtClean="0"/>
+              <a:rPr lang="en-US"/>
               <a:t>Third level</a:t>
             </a:r>
           </a:p>
           <a:p>
             <a:pPr lvl="3"/>
             <a:r>
-              <a:rPr lang="en-US" smtClean="0"/>
+              <a:rPr lang="en-US"/>
               <a:t>Fourth level</a:t>
             </a:r>
           </a:p>
           <a:p>
             <a:pPr lvl="4"/>
             <a:r>
-              <a:rPr lang="en-US" smtClean="0"/>
+              <a:rPr lang="en-US"/>
               <a:t>Fifth level</a:t>
             </a:r>
-            <a:endParaRPr lang="en-US"/>
           </a:p>
         </p:txBody>
       </p:sp>
@@ -2372,7 +2353,7 @@
           <a:p>
             <a:pPr lvl="0"/>
             <a:r>
-              <a:rPr lang="en-US" smtClean="0"/>
+              <a:rPr lang="en-US"/>
               <a:t>Click to edit Master text styles</a:t>
             </a:r>
           </a:p>
@@ -2395,7 +2376,7 @@
           <a:p>
             <a:fld id="{CEB23FBE-18A0-7F48-9D3B-04F8D8EBF31D}" type="datetimeFigureOut">
               <a:rPr lang="en-US" smtClean="0"/>
-              <a:t>5/6/17</a:t>
+              <a:t>5/25/22</a:t>
             </a:fld>
             <a:endParaRPr lang="en-US"/>
           </a:p>
@@ -2498,10 +2479,9 @@
           </a:lstStyle>
           <a:p>
             <a:r>
-              <a:rPr lang="en-US" smtClean="0"/>
+              <a:rPr lang="en-US"/>
               <a:t>Click to edit Master title style</a:t>
             </a:r>
-            <a:endParaRPr lang="en-US"/>
           </a:p>
         </p:txBody>
       </p:sp>
@@ -2625,7 +2605,7 @@
           <a:p>
             <a:pPr lvl="0"/>
             <a:r>
-              <a:rPr lang="en-US" smtClean="0"/>
+              <a:rPr lang="en-US"/>
               <a:t>Click to edit Master text styles</a:t>
             </a:r>
           </a:p>
@@ -2648,7 +2628,7 @@
           <a:p>
             <a:fld id="{CEB23FBE-18A0-7F48-9D3B-04F8D8EBF31D}" type="datetimeFigureOut">
               <a:rPr lang="en-US" smtClean="0"/>
-              <a:t>5/6/17</a:t>
+              <a:t>5/25/22</a:t>
             </a:fld>
             <a:endParaRPr lang="en-US"/>
           </a:p>
@@ -2757,10 +2737,9 @@
           <a:lstStyle/>
           <a:p>
             <a:r>
-              <a:rPr lang="en-US" smtClean="0"/>
+              <a:rPr lang="en-US"/>
               <a:t>Click to edit Master title style</a:t>
             </a:r>
-            <a:endParaRPr lang="en-US"/>
           </a:p>
         </p:txBody>
       </p:sp>
@@ -2791,38 +2770,37 @@
           <a:p>
             <a:pPr lvl="0"/>
             <a:r>
-              <a:rPr lang="en-US" smtClean="0"/>
+              <a:rPr lang="en-US"/>
               <a:t>Click to edit Master text styles</a:t>
             </a:r>
           </a:p>
           <a:p>
             <a:pPr lvl="1"/>
             <a:r>
-              <a:rPr lang="en-US" smtClean="0"/>
+              <a:rPr lang="en-US"/>
               <a:t>Second level</a:t>
             </a:r>
           </a:p>
           <a:p>
             <a:pPr lvl="2"/>
             <a:r>
-              <a:rPr lang="en-US" smtClean="0"/>
+              <a:rPr lang="en-US"/>
               <a:t>Third level</a:t>
             </a:r>
           </a:p>
           <a:p>
             <a:pPr lvl="3"/>
             <a:r>
-              <a:rPr lang="en-US" smtClean="0"/>
+              <a:rPr lang="en-US"/>
               <a:t>Fourth level</a:t>
             </a:r>
           </a:p>
           <a:p>
             <a:pPr lvl="4"/>
             <a:r>
-              <a:rPr lang="en-US" smtClean="0"/>
+              <a:rPr lang="en-US"/>
               <a:t>Fifth level</a:t>
             </a:r>
-            <a:endParaRPr lang="en-US"/>
           </a:p>
         </p:txBody>
       </p:sp>
@@ -2861,7 +2839,7 @@
           <a:p>
             <a:fld id="{CEB23FBE-18A0-7F48-9D3B-04F8D8EBF31D}" type="datetimeFigureOut">
               <a:rPr lang="en-US" smtClean="0"/>
-              <a:t>5/6/17</a:t>
+              <a:t>5/25/22</a:t>
             </a:fld>
             <a:endParaRPr lang="en-US"/>
           </a:p>
@@ -3275,22 +3253,13 @@
           <a:p>
             <a:pPr defTabSz="914400"/>
             <a:r>
-              <a:rPr lang="en-US" sz="1400" b="1" dirty="0" smtClean="0">
+              <a:rPr lang="en-US" sz="1400" b="1" dirty="0">
                 <a:solidFill>
                   <a:prstClr val="black"/>
                 </a:solidFill>
                 <a:latin typeface="Calibri"/>
               </a:rPr>
-              <a:t>DM </a:t>
-            </a:r>
-            <a:r>
-              <a:rPr lang="en-US" sz="1400" b="1" dirty="0" smtClean="0">
-                <a:solidFill>
-                  <a:prstClr val="black"/>
-                </a:solidFill>
-                <a:latin typeface="Calibri"/>
-              </a:rPr>
-              <a:t>System Science Team</a:t>
+              <a:t>DM System Science Team</a:t>
             </a:r>
             <a:endParaRPr lang="en-US" sz="1400" dirty="0">
               <a:solidFill>
@@ -3339,7 +3308,7 @@
           <a:p>
             <a:pPr algn="ctr" defTabSz="914400"/>
             <a:r>
-              <a:rPr lang="en-US" sz="1400" b="1" dirty="0" smtClean="0">
+              <a:rPr lang="en-US" sz="1400" b="1" dirty="0">
                 <a:solidFill>
                   <a:prstClr val="black"/>
                 </a:solidFill>
@@ -3395,7 +3364,7 @@
           <a:p>
             <a:pPr algn="ctr" defTabSz="914400"/>
             <a:r>
-              <a:rPr lang="en-US" sz="1400" b="1" dirty="0" smtClean="0">
+              <a:rPr lang="en-US" sz="1400" b="1" dirty="0">
                 <a:solidFill>
                   <a:prstClr val="black"/>
                 </a:solidFill>
@@ -3481,34 +3450,16 @@
           <a:p>
             <a:pPr algn="ctr" defTabSz="914400"/>
             <a:r>
-              <a:rPr lang="en-US" sz="1400" b="1" dirty="0" smtClean="0">
+              <a:rPr lang="en-US" sz="1400" b="1" dirty="0">
                 <a:solidFill>
                   <a:prstClr val="black"/>
                 </a:solidFill>
                 <a:latin typeface="Calibri"/>
               </a:rPr>
-              <a:t>DM </a:t>
-            </a:r>
-            <a:r>
-              <a:rPr lang="en-US" sz="1400" b="1" dirty="0" smtClean="0">
-                <a:solidFill>
-                  <a:prstClr val="black"/>
-                </a:solidFill>
-                <a:latin typeface="Calibri"/>
-              </a:rPr>
-              <a:t>Subsystem Scientist</a:t>
-            </a:r>
-            <a:r>
-              <a:rPr lang="en-US" sz="1400" b="1" dirty="0" smtClean="0">
-                <a:solidFill>
-                  <a:prstClr val="black"/>
-                </a:solidFill>
-                <a:latin typeface="Calibri"/>
-              </a:rPr>
-              <a:t/>
+              <a:t>DM Subsystem Scientist</a:t>
             </a:r>
             <a:br>
-              <a:rPr lang="en-US" sz="1400" b="1" dirty="0" smtClean="0">
+              <a:rPr lang="en-US" sz="1400" b="1" dirty="0">
                 <a:solidFill>
                   <a:prstClr val="black"/>
                 </a:solidFill>
@@ -3516,7 +3467,7 @@
               </a:rPr>
             </a:br>
             <a:r>
-              <a:rPr lang="en-US" sz="1400" b="1" dirty="0" smtClean="0">
+              <a:rPr lang="en-US" sz="1400" b="1" dirty="0">
                 <a:solidFill>
                   <a:prstClr val="black"/>
                 </a:solidFill>
@@ -3569,34 +3520,16 @@
           <a:p>
             <a:pPr algn="ctr" defTabSz="914400"/>
             <a:r>
-              <a:rPr lang="en-US" sz="1400" b="1" dirty="0" smtClean="0">
+              <a:rPr lang="en-US" sz="1400" b="1" dirty="0">
                 <a:solidFill>
                   <a:prstClr val="black"/>
                 </a:solidFill>
                 <a:latin typeface="Calibri"/>
               </a:rPr>
-              <a:t>DM </a:t>
-            </a:r>
-            <a:r>
-              <a:rPr lang="en-US" sz="1400" b="1" dirty="0" smtClean="0">
-                <a:solidFill>
-                  <a:prstClr val="black"/>
-                </a:solidFill>
-                <a:latin typeface="Calibri"/>
-              </a:rPr>
-              <a:t>SS Analyst</a:t>
-            </a:r>
-            <a:r>
-              <a:rPr lang="en-US" sz="1400" b="1" dirty="0" smtClean="0">
-                <a:solidFill>
-                  <a:prstClr val="black"/>
-                </a:solidFill>
-                <a:latin typeface="Calibri"/>
-              </a:rPr>
-              <a:t/>
+              <a:t>DM SS Analyst</a:t>
             </a:r>
             <a:br>
-              <a:rPr lang="en-US" sz="1400" b="1" dirty="0" smtClean="0">
+              <a:rPr lang="en-US" sz="1400" b="1" dirty="0">
                 <a:solidFill>
                   <a:prstClr val="black"/>
                 </a:solidFill>
@@ -3604,7 +3537,7 @@
               </a:rPr>
             </a:br>
             <a:r>
-              <a:rPr lang="en-US" sz="1400" b="1" dirty="0" smtClean="0">
+              <a:rPr lang="en-US" sz="1400" b="1" dirty="0">
                 <a:solidFill>
                   <a:prstClr val="black"/>
                 </a:solidFill>
@@ -3657,34 +3590,16 @@
           <a:p>
             <a:pPr algn="ctr" defTabSz="914400"/>
             <a:r>
-              <a:rPr lang="en-US" sz="1400" b="1" dirty="0" smtClean="0">
+              <a:rPr lang="en-US" sz="1400" b="1" dirty="0">
                 <a:solidFill>
                   <a:prstClr val="black"/>
                 </a:solidFill>
                 <a:latin typeface="Calibri"/>
               </a:rPr>
-              <a:t>DM </a:t>
-            </a:r>
-            <a:r>
-              <a:rPr lang="en-US" sz="1400" b="1" dirty="0" smtClean="0">
-                <a:solidFill>
-                  <a:prstClr val="black"/>
-                </a:solidFill>
-                <a:latin typeface="Calibri"/>
-              </a:rPr>
-              <a:t>SS Analyst</a:t>
-            </a:r>
-            <a:r>
-              <a:rPr lang="en-US" sz="1400" b="1" dirty="0" smtClean="0">
-                <a:solidFill>
-                  <a:prstClr val="black"/>
-                </a:solidFill>
-                <a:latin typeface="Calibri"/>
-              </a:rPr>
-              <a:t/>
+              <a:t>DM SS Analyst</a:t>
             </a:r>
             <a:br>
-              <a:rPr lang="en-US" sz="1400" b="1" dirty="0" smtClean="0">
+              <a:rPr lang="en-US" sz="1400" b="1" dirty="0">
                 <a:solidFill>
                   <a:prstClr val="black"/>
                 </a:solidFill>
@@ -3692,7 +3607,7 @@
               </a:rPr>
             </a:br>
             <a:r>
-              <a:rPr lang="en-US" sz="1400" b="1" dirty="0" smtClean="0">
+              <a:rPr lang="en-US" sz="1400" b="1" dirty="0">
                 <a:solidFill>
                   <a:prstClr val="black"/>
                 </a:solidFill>
@@ -3745,7 +3660,7 @@
           <a:p>
             <a:pPr algn="ctr" defTabSz="914400"/>
             <a:r>
-              <a:rPr lang="en-US" sz="1400" b="1" dirty="0" smtClean="0">
+              <a:rPr lang="en-US" sz="1400" b="1" dirty="0">
                 <a:solidFill>
                   <a:prstClr val="black"/>
                 </a:solidFill>
@@ -3754,7 +3669,7 @@
               <a:t>Alert Production Scientist</a:t>
             </a:r>
             <a:br>
-              <a:rPr lang="en-US" sz="1400" b="1" dirty="0" smtClean="0">
+              <a:rPr lang="en-US" sz="1400" b="1" dirty="0">
                 <a:solidFill>
                   <a:prstClr val="black"/>
                 </a:solidFill>
@@ -3762,7 +3677,7 @@
               </a:rPr>
             </a:br>
             <a:r>
-              <a:rPr lang="en-US" sz="1400" b="1" dirty="0" smtClean="0">
+              <a:rPr lang="en-US" sz="1400" b="1" dirty="0">
                 <a:solidFill>
                   <a:prstClr val="black"/>
                 </a:solidFill>
@@ -3771,7 +3686,7 @@
               <a:t>(Eric </a:t>
             </a:r>
             <a:r>
-              <a:rPr lang="en-US" sz="1400" b="1" dirty="0" err="1" smtClean="0">
+              <a:rPr lang="en-US" sz="1400" b="1" dirty="0" err="1">
                 <a:solidFill>
                   <a:prstClr val="black"/>
                 </a:solidFill>
@@ -3780,7 +3695,7 @@
               <a:t>Bellm</a:t>
             </a:r>
             <a:r>
-              <a:rPr lang="en-US" sz="1400" b="1" dirty="0" smtClean="0">
+              <a:rPr lang="en-US" sz="1400" b="1" dirty="0">
                 <a:solidFill>
                   <a:prstClr val="black"/>
                 </a:solidFill>
@@ -3833,7 +3748,7 @@
           <a:p>
             <a:pPr algn="ctr" defTabSz="914400"/>
             <a:r>
-              <a:rPr lang="en-US" sz="1400" b="1" dirty="0" smtClean="0">
+              <a:rPr lang="en-US" sz="1400" b="1" dirty="0">
                 <a:solidFill>
                   <a:prstClr val="black"/>
                 </a:solidFill>
@@ -3842,7 +3757,7 @@
               <a:t>Data Release Production Scientist</a:t>
             </a:r>
             <a:br>
-              <a:rPr lang="en-US" sz="1400" b="1" dirty="0" smtClean="0">
+              <a:rPr lang="en-US" sz="1400" b="1" dirty="0">
                 <a:solidFill>
                   <a:prstClr val="black"/>
                 </a:solidFill>
@@ -3850,7 +3765,7 @@
               </a:rPr>
             </a:br>
             <a:r>
-              <a:rPr lang="en-US" sz="1400" b="1" dirty="0" smtClean="0">
+              <a:rPr lang="en-US" sz="1400" b="1" dirty="0">
                 <a:solidFill>
                   <a:prstClr val="black"/>
                 </a:solidFill>
@@ -3903,7 +3818,7 @@
           <a:p>
             <a:pPr algn="ctr" defTabSz="914400"/>
             <a:r>
-              <a:rPr lang="en-US" sz="1400" b="1" dirty="0" smtClean="0">
+              <a:rPr lang="en-US" sz="1400" b="1" dirty="0">
                 <a:solidFill>
                   <a:prstClr val="black"/>
                 </a:solidFill>
@@ -3912,7 +3827,7 @@
               <a:t>Level 3 Capabilities Scientist</a:t>
             </a:r>
             <a:br>
-              <a:rPr lang="en-US" sz="1400" b="1" dirty="0" smtClean="0">
+              <a:rPr lang="en-US" sz="1400" b="1" dirty="0">
                 <a:solidFill>
                   <a:prstClr val="black"/>
                 </a:solidFill>
@@ -3920,7 +3835,7 @@
               </a:rPr>
             </a:br>
             <a:r>
-              <a:rPr lang="en-US" sz="1400" b="1" dirty="0" smtClean="0">
+              <a:rPr lang="en-US" sz="1400" b="1" dirty="0">
                 <a:solidFill>
                   <a:prstClr val="black"/>
                 </a:solidFill>
@@ -3973,7 +3888,7 @@
           <a:p>
             <a:pPr algn="ctr" defTabSz="914400"/>
             <a:r>
-              <a:rPr lang="en-US" sz="1400" b="1" dirty="0" smtClean="0">
+              <a:rPr lang="en-US" sz="1400" b="1" dirty="0">
                 <a:solidFill>
                   <a:prstClr val="black"/>
                 </a:solidFill>
@@ -3982,7 +3897,7 @@
               <a:t>SUIT Scientist</a:t>
             </a:r>
             <a:br>
-              <a:rPr lang="en-US" sz="1400" b="1" dirty="0" smtClean="0">
+              <a:rPr lang="en-US" sz="1400" b="1" dirty="0">
                 <a:solidFill>
                   <a:prstClr val="black"/>
                 </a:solidFill>
@@ -3990,7 +3905,7 @@
               </a:rPr>
             </a:br>
             <a:r>
-              <a:rPr lang="en-US" sz="1400" b="1" dirty="0" smtClean="0">
+              <a:rPr lang="en-US" sz="1400" b="1" dirty="0">
                 <a:solidFill>
                   <a:prstClr val="black"/>
                 </a:solidFill>
@@ -4043,7 +3958,7 @@
           <a:p>
             <a:pPr algn="ctr" defTabSz="914400"/>
             <a:r>
-              <a:rPr lang="en-US" sz="1400" b="1" dirty="0" smtClean="0">
+              <a:rPr lang="en-US" sz="1400" b="1" dirty="0">
                 <a:solidFill>
                   <a:prstClr val="black"/>
                 </a:solidFill>
@@ -4052,7 +3967,7 @@
               <a:t>DM Science Pipelines Scientist</a:t>
             </a:r>
             <a:br>
-              <a:rPr lang="en-US" sz="1400" b="1" dirty="0" smtClean="0">
+              <a:rPr lang="en-US" sz="1400" b="1" dirty="0">
                 <a:solidFill>
                   <a:prstClr val="black"/>
                 </a:solidFill>
@@ -4060,7 +3975,7 @@
               </a:rPr>
             </a:br>
             <a:r>
-              <a:rPr lang="en-US" sz="1400" b="1" dirty="0" smtClean="0">
+              <a:rPr lang="en-US" sz="1400" b="1" dirty="0">
                 <a:solidFill>
                   <a:prstClr val="black"/>
                 </a:solidFill>
@@ -4119,34 +4034,7 @@
                 </a:solidFill>
                 <a:latin typeface="Calibri"/>
               </a:rPr>
-              <a:t>DM </a:t>
-            </a:r>
-            <a:r>
-              <a:rPr lang="en-US" sz="1400" b="1" dirty="0" smtClean="0">
-                <a:solidFill>
-                  <a:prstClr val="black"/>
-                </a:solidFill>
-                <a:latin typeface="Calibri"/>
-              </a:rPr>
-              <a:t>Science </a:t>
-            </a:r>
-            <a:r>
-              <a:rPr lang="en-US" sz="1400" b="1" dirty="0" smtClean="0">
-                <a:solidFill>
-                  <a:prstClr val="black"/>
-                </a:solidFill>
-                <a:latin typeface="Calibri"/>
-              </a:rPr>
-              <a:t>Validation Scientist</a:t>
-            </a:r>
-            <a:r>
-              <a:rPr lang="en-US" sz="1400" b="1" dirty="0">
-                <a:solidFill>
-                  <a:prstClr val="black"/>
-                </a:solidFill>
-                <a:latin typeface="Calibri"/>
-              </a:rPr>
-              <a:t/>
+              <a:t>DM Science Validation Scientist</a:t>
             </a:r>
             <a:br>
               <a:rPr lang="en-US" sz="1400" b="1" dirty="0">
@@ -4157,7 +4045,7 @@
               </a:rPr>
             </a:br>
             <a:r>
-              <a:rPr lang="en-US" sz="1400" b="1" dirty="0" smtClean="0">
+              <a:rPr lang="en-US" sz="1400" b="1" dirty="0">
                 <a:solidFill>
                   <a:prstClr val="black"/>
                 </a:solidFill>
@@ -4165,12 +4053,6 @@
               </a:rPr>
               <a:t>(Position Open)</a:t>
             </a:r>
-            <a:endParaRPr lang="en-US" sz="1400" b="1" dirty="0">
-              <a:solidFill>
-                <a:prstClr val="black"/>
-              </a:solidFill>
-              <a:latin typeface="Calibri"/>
-            </a:endParaRPr>
           </a:p>
         </p:txBody>
       </p:sp>
@@ -4377,7 +4259,7 @@
           <a:lstStyle/>
           <a:p>
             <a:r>
-              <a:rPr lang="en-US" sz="1400" b="1" dirty="0" smtClean="0">
+              <a:rPr lang="en-US" sz="1400" b="1" dirty="0">
                 <a:solidFill>
                   <a:prstClr val="black"/>
                 </a:solidFill>
@@ -4443,7 +4325,7 @@
           <a:lstStyle/>
           <a:p>
             <a:r>
-              <a:rPr lang="en-US" sz="1400" b="1" dirty="0" smtClean="0">
+              <a:rPr lang="en-US" sz="1400" b="1" dirty="0">
                 <a:solidFill>
                   <a:prstClr val="black"/>
                 </a:solidFill>
@@ -4490,7 +4372,7 @@
           <a:p>
             <a:pPr algn="ctr" defTabSz="914400"/>
             <a:r>
-              <a:rPr lang="en-US" sz="1400" b="1" dirty="0" smtClean="0">
+              <a:rPr lang="en-US" sz="1400" b="1" dirty="0">
                 <a:solidFill>
                   <a:prstClr val="black"/>
                 </a:solidFill>
@@ -4499,7 +4381,7 @@
               <a:t>Data Processing Scientist</a:t>
             </a:r>
             <a:br>
-              <a:rPr lang="en-US" sz="1400" b="1" dirty="0" smtClean="0">
+              <a:rPr lang="en-US" sz="1400" b="1" dirty="0">
                 <a:solidFill>
                   <a:prstClr val="black"/>
                 </a:solidFill>
@@ -4507,7 +4389,7 @@
               </a:rPr>
             </a:br>
             <a:r>
-              <a:rPr lang="en-US" sz="1400" b="1" dirty="0" smtClean="0">
+              <a:rPr lang="en-US" sz="1400" b="1" dirty="0">
                 <a:solidFill>
                   <a:prstClr val="black"/>
                 </a:solidFill>
@@ -4516,7 +4398,7 @@
               <a:t>(Robert </a:t>
             </a:r>
             <a:r>
-              <a:rPr lang="en-US" sz="1400" b="1" dirty="0" err="1" smtClean="0">
+              <a:rPr lang="en-US" sz="1400" b="1" dirty="0" err="1">
                 <a:solidFill>
                   <a:prstClr val="black"/>
                 </a:solidFill>
@@ -4525,22 +4407,13 @@
               <a:t>Gruendl</a:t>
             </a:r>
             <a:r>
-              <a:rPr lang="en-US" sz="1400" b="1" dirty="0" smtClean="0">
+              <a:rPr lang="en-US" sz="1400" b="1" dirty="0">
                 <a:solidFill>
                   <a:prstClr val="black"/>
                 </a:solidFill>
                 <a:latin typeface="Calibri"/>
               </a:rPr>
-              <a:t>, </a:t>
-            </a:r>
-            <a:r>
-              <a:rPr lang="en-US" sz="1400" b="1" dirty="0" smtClean="0">
-                <a:solidFill>
-                  <a:prstClr val="black"/>
-                </a:solidFill>
-                <a:latin typeface="Calibri"/>
-              </a:rPr>
-              <a:t>NCSA)</a:t>
+              <a:t>, NCSA)</a:t>
             </a:r>
             <a:endParaRPr lang="en-US" sz="1400" dirty="0">
               <a:solidFill>
@@ -4561,13 +4434,6 @@
   <p:clrMapOvr>
     <a:masterClrMapping/>
   </p:clrMapOvr>
-  <p:timing>
-    <p:tnLst>
-      <p:par>
-        <p:cTn id="1" dur="indefinite" restart="never" nodeType="tmRoot"/>
-      </p:par>
-    </p:tnLst>
-  </p:timing>
 </p:sld>
 </file>
 
@@ -4626,22 +4492,13 @@
           <a:p>
             <a:pPr defTabSz="914400"/>
             <a:r>
-              <a:rPr lang="en-US" sz="1400" b="1" dirty="0" smtClean="0">
+              <a:rPr lang="en-US" sz="1400" b="1" dirty="0">
                 <a:solidFill>
                   <a:prstClr val="black"/>
                 </a:solidFill>
                 <a:latin typeface="Calibri"/>
               </a:rPr>
-              <a:t>DM Science </a:t>
-            </a:r>
-            <a:r>
-              <a:rPr lang="en-US" sz="1400" b="1" dirty="0" smtClean="0">
-                <a:solidFill>
-                  <a:prstClr val="black"/>
-                </a:solidFill>
-                <a:latin typeface="Calibri"/>
-              </a:rPr>
-              <a:t>Validation Team</a:t>
+              <a:t>DM Science Validation Team</a:t>
             </a:r>
             <a:endParaRPr lang="en-US" sz="1400" dirty="0">
               <a:solidFill>
@@ -4691,7 +4548,7 @@
           <a:p>
             <a:pPr algn="ctr" defTabSz="914400"/>
             <a:r>
-              <a:rPr lang="en-US" sz="1400" b="1" dirty="0" smtClean="0">
+              <a:rPr lang="en-US" sz="1400" b="1" dirty="0">
                 <a:solidFill>
                   <a:prstClr val="black"/>
                 </a:solidFill>
@@ -4744,48 +4601,13 @@
           <a:p>
             <a:pPr algn="ctr" defTabSz="914400"/>
             <a:r>
-              <a:rPr lang="en-US" sz="1400" b="1" dirty="0" smtClean="0">
+              <a:rPr lang="en-US" sz="1400" b="1" dirty="0">
                 <a:solidFill>
                   <a:prstClr val="black"/>
                 </a:solidFill>
                 <a:latin typeface="Calibri"/>
               </a:rPr>
-              <a:t>DM Science </a:t>
-            </a:r>
-            <a:r>
-              <a:rPr lang="en-US" sz="1400" b="1" dirty="0" smtClean="0">
-                <a:solidFill>
-                  <a:prstClr val="black"/>
-                </a:solidFill>
-                <a:latin typeface="Calibri"/>
-              </a:rPr>
-              <a:t>Pipelines Scientist</a:t>
-            </a:r>
-            <a:r>
-              <a:rPr lang="en-US" sz="1400" b="1" dirty="0" smtClean="0">
-                <a:solidFill>
-                  <a:prstClr val="black"/>
-                </a:solidFill>
-                <a:latin typeface="Calibri"/>
-              </a:rPr>
-              <a:t/>
-            </a:r>
-            <a:br>
-              <a:rPr lang="en-US" sz="1400" b="1" dirty="0" smtClean="0">
-                <a:solidFill>
-                  <a:prstClr val="black"/>
-                </a:solidFill>
-                <a:latin typeface="Calibri"/>
-              </a:rPr>
-            </a:br>
-            <a:r>
-              <a:rPr lang="en-US" sz="1400" b="1" dirty="0" smtClean="0">
-                <a:solidFill>
-                  <a:prstClr val="black"/>
-                </a:solidFill>
-                <a:latin typeface="Calibri"/>
-              </a:rPr>
-              <a:t>(Robert Lupton)</a:t>
+              <a:t>DM Science Pipelines Scientist</a:t>
             </a:r>
             <a:endParaRPr lang="en-US" sz="1400" dirty="0">
               <a:solidFill>
@@ -4842,31 +4664,13 @@
           <a:p>
             <a:pPr algn="ctr" defTabSz="914400"/>
             <a:r>
-              <a:rPr lang="en-US" sz="1400" b="1" dirty="0" smtClean="0">
+              <a:rPr lang="en-US" sz="1400" b="1" dirty="0">
                 <a:solidFill>
                   <a:prstClr val="black"/>
                 </a:solidFill>
                 <a:latin typeface="Calibri"/>
               </a:rPr>
-              <a:t>DM </a:t>
-            </a:r>
-            <a:r>
-              <a:rPr lang="en-US" sz="1400" b="1" dirty="0" smtClean="0">
-                <a:solidFill>
-                  <a:prstClr val="black"/>
-                </a:solidFill>
-                <a:latin typeface="Calibri"/>
-              </a:rPr>
-              <a:t>SST Staff </a:t>
-            </a:r>
-            <a:r>
-              <a:rPr lang="en-US" sz="1400" b="1" dirty="0" smtClean="0">
-                <a:solidFill>
-                  <a:prstClr val="black"/>
-                </a:solidFill>
-                <a:latin typeface="Calibri"/>
-              </a:rPr>
-              <a:t>(variable)</a:t>
+              <a:t>DM SST Staff (variable)</a:t>
             </a:r>
             <a:endParaRPr lang="en-US" sz="1400" dirty="0">
               <a:solidFill>
@@ -4923,7 +4727,7 @@
           <a:p>
             <a:pPr algn="ctr" defTabSz="914400"/>
             <a:r>
-              <a:rPr lang="en-US" sz="1400" b="1" dirty="0" smtClean="0">
+              <a:rPr lang="en-US" sz="1400" b="1" dirty="0">
                 <a:solidFill>
                   <a:prstClr val="black"/>
                 </a:solidFill>
@@ -4986,7 +4790,7 @@
           <a:p>
             <a:pPr algn="ctr" defTabSz="914400"/>
             <a:r>
-              <a:rPr lang="en-US" sz="1400" b="1" dirty="0" smtClean="0">
+              <a:rPr lang="en-US" sz="1400" b="1" dirty="0">
                 <a:solidFill>
                   <a:prstClr val="black"/>
                 </a:solidFill>
@@ -5195,32 +4999,8 @@
                 </a:solidFill>
                 <a:latin typeface="Calibri"/>
               </a:rPr>
-              <a:t>DM </a:t>
-            </a:r>
-            <a:r>
-              <a:rPr lang="en-US" sz="1400" b="1" dirty="0" smtClean="0">
-                <a:solidFill>
-                  <a:prstClr val="black"/>
-                </a:solidFill>
-                <a:latin typeface="Calibri"/>
-              </a:rPr>
-              <a:t>Science </a:t>
-            </a:r>
-            <a:r>
-              <a:rPr lang="en-US" sz="1400" b="1" dirty="0" smtClean="0">
-                <a:solidFill>
-                  <a:prstClr val="black"/>
-                </a:solidFill>
-                <a:latin typeface="Calibri"/>
-              </a:rPr>
-              <a:t>Validation Scientist</a:t>
-            </a:r>
-            <a:endParaRPr lang="en-US" sz="1400" b="1" dirty="0">
-              <a:solidFill>
-                <a:prstClr val="black"/>
-              </a:solidFill>
-              <a:latin typeface="Calibri"/>
-            </a:endParaRPr>
+              <a:t>DM Science Validation Scientist</a:t>
+            </a:r>
           </a:p>
         </p:txBody>
       </p:sp>
@@ -5266,13 +5046,6 @@
   <p:clrMapOvr>
     <a:masterClrMapping/>
   </p:clrMapOvr>
-  <p:timing>
-    <p:tnLst>
-      <p:par>
-        <p:cTn id="1" dur="indefinite" restart="never" nodeType="tmRoot"/>
-      </p:par>
-    </p:tnLst>
-  </p:timing>
 </p:sld>
 </file>
 

</xml_diff>